<commit_message>
Apresentação e artigo v2
</commit_message>
<xml_diff>
--- a/Apresentacao.pptx
+++ b/Apresentacao.pptx
@@ -173,7 +173,7 @@
           <a:noFill/>
           <a:extLst>
             <a:ext uri="{909E8E84-426E-40dd-AFC4-6F175D3DCCD1}">
-              <a14:hiddenFill xmlns="" xmlns:a14="http://schemas.microsoft.com/office/drawing/2010/main">
+              <a14:hiddenFill xmlns:a14="http://schemas.microsoft.com/office/drawing/2010/main" xmlns="">
                 <a:solidFill>
                   <a:srgbClr val="FFFFFF"/>
                 </a:solidFill>
@@ -233,7 +233,7 @@
             </a:ln>
             <a:extLst>
               <a:ext uri="{91240B29-F687-4f45-9708-019B960494DF}">
-                <a14:hiddenLine xmlns="" xmlns:a14="http://schemas.microsoft.com/office/drawing/2010/main" w="9525">
+                <a14:hiddenLine xmlns:a14="http://schemas.microsoft.com/office/drawing/2010/main" xmlns="" w="9525">
                   <a:solidFill>
                     <a:srgbClr val="000000"/>
                   </a:solidFill>
@@ -323,7 +323,7 @@
             </a:ln>
             <a:extLst>
               <a:ext uri="{91240B29-F687-4f45-9708-019B960494DF}">
-                <a14:hiddenLine xmlns="" xmlns:a14="http://schemas.microsoft.com/office/drawing/2010/main" w="9525">
+                <a14:hiddenLine xmlns:a14="http://schemas.microsoft.com/office/drawing/2010/main" xmlns="" w="9525">
                   <a:solidFill>
                     <a:srgbClr val="000000"/>
                   </a:solidFill>
@@ -413,7 +413,7 @@
             </a:ln>
             <a:extLst>
               <a:ext uri="{91240B29-F687-4f45-9708-019B960494DF}">
-                <a14:hiddenLine xmlns="" xmlns:a14="http://schemas.microsoft.com/office/drawing/2010/main" w="9525">
+                <a14:hiddenLine xmlns:a14="http://schemas.microsoft.com/office/drawing/2010/main" xmlns="" w="9525">
                   <a:solidFill>
                     <a:srgbClr val="000000"/>
                   </a:solidFill>
@@ -447,7 +447,7 @@
             </a:ln>
             <a:extLst>
               <a:ext uri="{91240B29-F687-4f45-9708-019B960494DF}">
-                <a14:hiddenLine xmlns="" xmlns:a14="http://schemas.microsoft.com/office/drawing/2010/main" w="9525">
+                <a14:hiddenLine xmlns:a14="http://schemas.microsoft.com/office/drawing/2010/main" xmlns="" w="9525">
                   <a:solidFill>
                     <a:srgbClr val="000000"/>
                   </a:solidFill>
@@ -537,7 +537,7 @@
             </a:ln>
             <a:extLst>
               <a:ext uri="{91240B29-F687-4f45-9708-019B960494DF}">
-                <a14:hiddenLine xmlns="" xmlns:a14="http://schemas.microsoft.com/office/drawing/2010/main" w="9525">
+                <a14:hiddenLine xmlns:a14="http://schemas.microsoft.com/office/drawing/2010/main" xmlns="" w="9525">
                   <a:solidFill>
                     <a:srgbClr val="000000"/>
                   </a:solidFill>
@@ -599,7 +599,7 @@
             </a:ln>
             <a:extLst>
               <a:ext uri="{91240B29-F687-4f45-9708-019B960494DF}">
-                <a14:hiddenLine xmlns="" xmlns:a14="http://schemas.microsoft.com/office/drawing/2010/main" w="9525">
+                <a14:hiddenLine xmlns:a14="http://schemas.microsoft.com/office/drawing/2010/main" xmlns="" w="9525">
                   <a:solidFill>
                     <a:srgbClr val="000000"/>
                   </a:solidFill>
@@ -661,7 +661,7 @@
             </a:ln>
             <a:extLst>
               <a:ext uri="{91240B29-F687-4f45-9708-019B960494DF}">
-                <a14:hiddenLine xmlns="" xmlns:a14="http://schemas.microsoft.com/office/drawing/2010/main" w="9525">
+                <a14:hiddenLine xmlns:a14="http://schemas.microsoft.com/office/drawing/2010/main" xmlns="" w="9525">
                   <a:solidFill>
                     <a:srgbClr val="000000"/>
                   </a:solidFill>
@@ -751,7 +751,7 @@
             </a:ln>
             <a:extLst>
               <a:ext uri="{91240B29-F687-4f45-9708-019B960494DF}">
-                <a14:hiddenLine xmlns="" xmlns:a14="http://schemas.microsoft.com/office/drawing/2010/main" w="9525">
+                <a14:hiddenLine xmlns:a14="http://schemas.microsoft.com/office/drawing/2010/main" xmlns="" w="9525">
                   <a:solidFill>
                     <a:srgbClr val="000000"/>
                   </a:solidFill>
@@ -813,7 +813,7 @@
             </a:ln>
             <a:extLst>
               <a:ext uri="{91240B29-F687-4f45-9708-019B960494DF}">
-                <a14:hiddenLine xmlns="" xmlns:a14="http://schemas.microsoft.com/office/drawing/2010/main" w="9525">
+                <a14:hiddenLine xmlns:a14="http://schemas.microsoft.com/office/drawing/2010/main" xmlns="" w="9525">
                   <a:solidFill>
                     <a:srgbClr val="000000"/>
                   </a:solidFill>
@@ -875,7 +875,7 @@
             </a:ln>
             <a:extLst>
               <a:ext uri="{91240B29-F687-4f45-9708-019B960494DF}">
-                <a14:hiddenLine xmlns="" xmlns:a14="http://schemas.microsoft.com/office/drawing/2010/main" w="9525">
+                <a14:hiddenLine xmlns:a14="http://schemas.microsoft.com/office/drawing/2010/main" xmlns="" w="9525">
                   <a:solidFill>
                     <a:srgbClr val="000000"/>
                   </a:solidFill>
@@ -965,7 +965,7 @@
             </a:ln>
             <a:extLst>
               <a:ext uri="{91240B29-F687-4f45-9708-019B960494DF}">
-                <a14:hiddenLine xmlns="" xmlns:a14="http://schemas.microsoft.com/office/drawing/2010/main" w="9525">
+                <a14:hiddenLine xmlns:a14="http://schemas.microsoft.com/office/drawing/2010/main" xmlns="" w="9525">
                   <a:solidFill>
                     <a:srgbClr val="000000"/>
                   </a:solidFill>
@@ -1055,7 +1055,7 @@
             </a:ln>
             <a:extLst>
               <a:ext uri="{91240B29-F687-4f45-9708-019B960494DF}">
-                <a14:hiddenLine xmlns="" xmlns:a14="http://schemas.microsoft.com/office/drawing/2010/main" w="9525">
+                <a14:hiddenLine xmlns:a14="http://schemas.microsoft.com/office/drawing/2010/main" xmlns="" w="9525">
                   <a:solidFill>
                     <a:srgbClr val="000000"/>
                   </a:solidFill>
@@ -1117,7 +1117,7 @@
             </a:ln>
             <a:extLst>
               <a:ext uri="{91240B29-F687-4f45-9708-019B960494DF}">
-                <a14:hiddenLine xmlns="" xmlns:a14="http://schemas.microsoft.com/office/drawing/2010/main" w="9525">
+                <a14:hiddenLine xmlns:a14="http://schemas.microsoft.com/office/drawing/2010/main" xmlns="" w="9525">
                   <a:solidFill>
                     <a:srgbClr val="000000"/>
                   </a:solidFill>
@@ -1227,7 +1227,7 @@
             </a:ln>
             <a:extLst>
               <a:ext uri="{91240B29-F687-4f45-9708-019B960494DF}">
-                <a14:hiddenLine xmlns="" xmlns:a14="http://schemas.microsoft.com/office/drawing/2010/main" w="9525">
+                <a14:hiddenLine xmlns:a14="http://schemas.microsoft.com/office/drawing/2010/main" xmlns="" w="9525">
                   <a:solidFill>
                     <a:srgbClr val="000000"/>
                   </a:solidFill>
@@ -1289,7 +1289,7 @@
             </a:ln>
             <a:extLst>
               <a:ext uri="{91240B29-F687-4f45-9708-019B960494DF}">
-                <a14:hiddenLine xmlns="" xmlns:a14="http://schemas.microsoft.com/office/drawing/2010/main" w="9525">
+                <a14:hiddenLine xmlns:a14="http://schemas.microsoft.com/office/drawing/2010/main" xmlns="" w="9525">
                   <a:solidFill>
                     <a:srgbClr val="000000"/>
                   </a:solidFill>
@@ -1379,7 +1379,7 @@
             </a:ln>
             <a:extLst>
               <a:ext uri="{91240B29-F687-4f45-9708-019B960494DF}">
-                <a14:hiddenLine xmlns="" xmlns:a14="http://schemas.microsoft.com/office/drawing/2010/main" w="9525">
+                <a14:hiddenLine xmlns:a14="http://schemas.microsoft.com/office/drawing/2010/main" xmlns="" w="9525">
                   <a:solidFill>
                     <a:srgbClr val="000000"/>
                   </a:solidFill>
@@ -1469,7 +1469,7 @@
             </a:ln>
             <a:extLst>
               <a:ext uri="{91240B29-F687-4f45-9708-019B960494DF}">
-                <a14:hiddenLine xmlns="" xmlns:a14="http://schemas.microsoft.com/office/drawing/2010/main" w="9525">
+                <a14:hiddenLine xmlns:a14="http://schemas.microsoft.com/office/drawing/2010/main" xmlns="" w="9525">
                   <a:solidFill>
                     <a:srgbClr val="000000"/>
                   </a:solidFill>
@@ -1531,7 +1531,7 @@
             </a:ln>
             <a:extLst>
               <a:ext uri="{91240B29-F687-4f45-9708-019B960494DF}">
-                <a14:hiddenLine xmlns="" xmlns:a14="http://schemas.microsoft.com/office/drawing/2010/main" w="9525">
+                <a14:hiddenLine xmlns:a14="http://schemas.microsoft.com/office/drawing/2010/main" xmlns="" w="9525">
                   <a:solidFill>
                     <a:srgbClr val="000000"/>
                   </a:solidFill>
@@ -1621,7 +1621,7 @@
             </a:ln>
             <a:extLst>
               <a:ext uri="{91240B29-F687-4f45-9708-019B960494DF}">
-                <a14:hiddenLine xmlns="" xmlns:a14="http://schemas.microsoft.com/office/drawing/2010/main" w="9525">
+                <a14:hiddenLine xmlns:a14="http://schemas.microsoft.com/office/drawing/2010/main" xmlns="" w="9525">
                   <a:solidFill>
                     <a:srgbClr val="000000"/>
                   </a:solidFill>
@@ -1711,7 +1711,7 @@
             </a:ln>
             <a:extLst>
               <a:ext uri="{91240B29-F687-4f45-9708-019B960494DF}">
-                <a14:hiddenLine xmlns="" xmlns:a14="http://schemas.microsoft.com/office/drawing/2010/main" w="9525">
+                <a14:hiddenLine xmlns:a14="http://schemas.microsoft.com/office/drawing/2010/main" xmlns="" w="9525">
                   <a:solidFill>
                     <a:srgbClr val="000000"/>
                   </a:solidFill>
@@ -1767,7 +1767,7 @@
             </a:ln>
             <a:extLst>
               <a:ext uri="{91240B29-F687-4f45-9708-019B960494DF}">
-                <a14:hiddenLine xmlns="" xmlns:a14="http://schemas.microsoft.com/office/drawing/2010/main" w="9525">
+                <a14:hiddenLine xmlns:a14="http://schemas.microsoft.com/office/drawing/2010/main" xmlns="" w="9525">
                   <a:solidFill>
                     <a:srgbClr val="000000"/>
                   </a:solidFill>
@@ -1857,7 +1857,7 @@
             </a:ln>
             <a:extLst>
               <a:ext uri="{91240B29-F687-4f45-9708-019B960494DF}">
-                <a14:hiddenLine xmlns="" xmlns:a14="http://schemas.microsoft.com/office/drawing/2010/main" w="9525">
+                <a14:hiddenLine xmlns:a14="http://schemas.microsoft.com/office/drawing/2010/main" xmlns="" w="9525">
                   <a:solidFill>
                     <a:srgbClr val="000000"/>
                   </a:solidFill>
@@ -1913,7 +1913,7 @@
             </a:ln>
             <a:extLst>
               <a:ext uri="{91240B29-F687-4f45-9708-019B960494DF}">
-                <a14:hiddenLine xmlns="" xmlns:a14="http://schemas.microsoft.com/office/drawing/2010/main" w="9525">
+                <a14:hiddenLine xmlns:a14="http://schemas.microsoft.com/office/drawing/2010/main" xmlns="" w="9525">
                   <a:solidFill>
                     <a:srgbClr val="000000"/>
                   </a:solidFill>
@@ -2003,7 +2003,7 @@
             </a:ln>
             <a:extLst>
               <a:ext uri="{91240B29-F687-4f45-9708-019B960494DF}">
-                <a14:hiddenLine xmlns="" xmlns:a14="http://schemas.microsoft.com/office/drawing/2010/main" w="9525">
+                <a14:hiddenLine xmlns:a14="http://schemas.microsoft.com/office/drawing/2010/main" xmlns="" w="9525">
                   <a:solidFill>
                     <a:srgbClr val="000000"/>
                   </a:solidFill>
@@ -2071,7 +2071,7 @@
             </a:ln>
             <a:extLst>
               <a:ext uri="{91240B29-F687-4f45-9708-019B960494DF}">
-                <a14:hiddenLine xmlns="" xmlns:a14="http://schemas.microsoft.com/office/drawing/2010/main" w="9525">
+                <a14:hiddenLine xmlns:a14="http://schemas.microsoft.com/office/drawing/2010/main" xmlns="" w="9525">
                   <a:solidFill>
                     <a:srgbClr val="000000"/>
                   </a:solidFill>
@@ -2161,7 +2161,7 @@
             </a:ln>
             <a:extLst>
               <a:ext uri="{91240B29-F687-4f45-9708-019B960494DF}">
-                <a14:hiddenLine xmlns="" xmlns:a14="http://schemas.microsoft.com/office/drawing/2010/main" w="9525">
+                <a14:hiddenLine xmlns:a14="http://schemas.microsoft.com/office/drawing/2010/main" xmlns="" w="9525">
                   <a:solidFill>
                     <a:srgbClr val="000000"/>
                   </a:solidFill>
@@ -2229,7 +2229,7 @@
             </a:ln>
             <a:extLst>
               <a:ext uri="{91240B29-F687-4f45-9708-019B960494DF}">
-                <a14:hiddenLine xmlns="" xmlns:a14="http://schemas.microsoft.com/office/drawing/2010/main" w="9525">
+                <a14:hiddenLine xmlns:a14="http://schemas.microsoft.com/office/drawing/2010/main" xmlns="" w="9525">
                   <a:solidFill>
                     <a:srgbClr val="000000"/>
                   </a:solidFill>
@@ -2319,7 +2319,7 @@
             </a:ln>
             <a:extLst>
               <a:ext uri="{91240B29-F687-4f45-9708-019B960494DF}">
-                <a14:hiddenLine xmlns="" xmlns:a14="http://schemas.microsoft.com/office/drawing/2010/main" w="9525">
+                <a14:hiddenLine xmlns:a14="http://schemas.microsoft.com/office/drawing/2010/main" xmlns="" w="9525">
                   <a:solidFill>
                     <a:srgbClr val="000000"/>
                   </a:solidFill>
@@ -2353,7 +2353,7 @@
             </a:ln>
             <a:extLst>
               <a:ext uri="{91240B29-F687-4f45-9708-019B960494DF}">
-                <a14:hiddenLine xmlns="" xmlns:a14="http://schemas.microsoft.com/office/drawing/2010/main" w="9525">
+                <a14:hiddenLine xmlns:a14="http://schemas.microsoft.com/office/drawing/2010/main" xmlns="" w="9525">
                   <a:solidFill>
                     <a:srgbClr val="000000"/>
                   </a:solidFill>
@@ -2443,7 +2443,7 @@
             </a:ln>
             <a:extLst>
               <a:ext uri="{91240B29-F687-4f45-9708-019B960494DF}">
-                <a14:hiddenLine xmlns="" xmlns:a14="http://schemas.microsoft.com/office/drawing/2010/main" w="9525">
+                <a14:hiddenLine xmlns:a14="http://schemas.microsoft.com/office/drawing/2010/main" xmlns="" w="9525">
                   <a:solidFill>
                     <a:srgbClr val="000000"/>
                   </a:solidFill>
@@ -2505,7 +2505,7 @@
             </a:ln>
             <a:extLst>
               <a:ext uri="{91240B29-F687-4f45-9708-019B960494DF}">
-                <a14:hiddenLine xmlns="" xmlns:a14="http://schemas.microsoft.com/office/drawing/2010/main" w="9525">
+                <a14:hiddenLine xmlns:a14="http://schemas.microsoft.com/office/drawing/2010/main" xmlns="" w="9525">
                   <a:solidFill>
                     <a:srgbClr val="000000"/>
                   </a:solidFill>
@@ -2567,7 +2567,7 @@
             </a:ln>
             <a:extLst>
               <a:ext uri="{91240B29-F687-4f45-9708-019B960494DF}">
-                <a14:hiddenLine xmlns="" xmlns:a14="http://schemas.microsoft.com/office/drawing/2010/main" w="9525">
+                <a14:hiddenLine xmlns:a14="http://schemas.microsoft.com/office/drawing/2010/main" xmlns="" w="9525">
                   <a:solidFill>
                     <a:srgbClr val="000000"/>
                   </a:solidFill>
@@ -2657,7 +2657,7 @@
             </a:ln>
             <a:extLst>
               <a:ext uri="{91240B29-F687-4f45-9708-019B960494DF}">
-                <a14:hiddenLine xmlns="" xmlns:a14="http://schemas.microsoft.com/office/drawing/2010/main" w="9525">
+                <a14:hiddenLine xmlns:a14="http://schemas.microsoft.com/office/drawing/2010/main" xmlns="" w="9525">
                   <a:solidFill>
                     <a:srgbClr val="000000"/>
                   </a:solidFill>
@@ -2725,7 +2725,7 @@
             </a:ln>
             <a:extLst>
               <a:ext uri="{91240B29-F687-4f45-9708-019B960494DF}">
-                <a14:hiddenLine xmlns="" xmlns:a14="http://schemas.microsoft.com/office/drawing/2010/main" w="9525">
+                <a14:hiddenLine xmlns:a14="http://schemas.microsoft.com/office/drawing/2010/main" xmlns="" w="9525">
                   <a:solidFill>
                     <a:srgbClr val="000000"/>
                   </a:solidFill>
@@ -2787,7 +2787,7 @@
             </a:ln>
             <a:extLst>
               <a:ext uri="{91240B29-F687-4f45-9708-019B960494DF}">
-                <a14:hiddenLine xmlns="" xmlns:a14="http://schemas.microsoft.com/office/drawing/2010/main" w="9525">
+                <a14:hiddenLine xmlns:a14="http://schemas.microsoft.com/office/drawing/2010/main" xmlns="" w="9525">
                   <a:solidFill>
                     <a:srgbClr val="000000"/>
                   </a:solidFill>
@@ -2877,7 +2877,7 @@
             </a:ln>
             <a:extLst>
               <a:ext uri="{91240B29-F687-4f45-9708-019B960494DF}">
-                <a14:hiddenLine xmlns="" xmlns:a14="http://schemas.microsoft.com/office/drawing/2010/main" w="9525">
+                <a14:hiddenLine xmlns:a14="http://schemas.microsoft.com/office/drawing/2010/main" xmlns="" w="9525">
                   <a:solidFill>
                     <a:srgbClr val="000000"/>
                   </a:solidFill>
@@ -2939,7 +2939,7 @@
             </a:ln>
             <a:extLst>
               <a:ext uri="{91240B29-F687-4f45-9708-019B960494DF}">
-                <a14:hiddenLine xmlns="" xmlns:a14="http://schemas.microsoft.com/office/drawing/2010/main" w="9525">
+                <a14:hiddenLine xmlns:a14="http://schemas.microsoft.com/office/drawing/2010/main" xmlns="" w="9525">
                   <a:solidFill>
                     <a:srgbClr val="000000"/>
                   </a:solidFill>
@@ -3029,7 +3029,7 @@
             </a:ln>
             <a:extLst>
               <a:ext uri="{91240B29-F687-4f45-9708-019B960494DF}">
-                <a14:hiddenLine xmlns="" xmlns:a14="http://schemas.microsoft.com/office/drawing/2010/main" w="9525">
+                <a14:hiddenLine xmlns:a14="http://schemas.microsoft.com/office/drawing/2010/main" xmlns="" w="9525">
                   <a:solidFill>
                     <a:srgbClr val="000000"/>
                   </a:solidFill>
@@ -3091,7 +3091,7 @@
             </a:ln>
             <a:extLst>
               <a:ext uri="{91240B29-F687-4f45-9708-019B960494DF}">
-                <a14:hiddenLine xmlns="" xmlns:a14="http://schemas.microsoft.com/office/drawing/2010/main" w="9525">
+                <a14:hiddenLine xmlns:a14="http://schemas.microsoft.com/office/drawing/2010/main" xmlns="" w="9525">
                   <a:solidFill>
                     <a:srgbClr val="000000"/>
                   </a:solidFill>
@@ -3181,7 +3181,7 @@
             </a:ln>
             <a:extLst>
               <a:ext uri="{91240B29-F687-4f45-9708-019B960494DF}">
-                <a14:hiddenLine xmlns="" xmlns:a14="http://schemas.microsoft.com/office/drawing/2010/main" w="9525">
+                <a14:hiddenLine xmlns:a14="http://schemas.microsoft.com/office/drawing/2010/main" xmlns="" w="9525">
                   <a:solidFill>
                     <a:srgbClr val="000000"/>
                   </a:solidFill>
@@ -3215,7 +3215,7 @@
             </a:ln>
             <a:extLst>
               <a:ext uri="{91240B29-F687-4f45-9708-019B960494DF}">
-                <a14:hiddenLine xmlns="" xmlns:a14="http://schemas.microsoft.com/office/drawing/2010/main" w="9525">
+                <a14:hiddenLine xmlns:a14="http://schemas.microsoft.com/office/drawing/2010/main" xmlns="" w="9525">
                   <a:solidFill>
                     <a:srgbClr val="000000"/>
                   </a:solidFill>
@@ -3280,7 +3280,7 @@
             </a:ln>
             <a:extLst>
               <a:ext uri="{91240B29-F687-4f45-9708-019B960494DF}">
-                <a14:hiddenLine xmlns="" xmlns:a14="http://schemas.microsoft.com/office/drawing/2010/main" w="9525">
+                <a14:hiddenLine xmlns:a14="http://schemas.microsoft.com/office/drawing/2010/main" xmlns="" w="9525">
                   <a:solidFill>
                     <a:srgbClr val="000000"/>
                   </a:solidFill>
@@ -3370,7 +3370,7 @@
             </a:ln>
             <a:extLst>
               <a:ext uri="{91240B29-F687-4f45-9708-019B960494DF}">
-                <a14:hiddenLine xmlns="" xmlns:a14="http://schemas.microsoft.com/office/drawing/2010/main" w="9525">
+                <a14:hiddenLine xmlns:a14="http://schemas.microsoft.com/office/drawing/2010/main" xmlns="" w="9525">
                   <a:solidFill>
                     <a:srgbClr val="000000"/>
                   </a:solidFill>
@@ -3432,7 +3432,7 @@
             </a:ln>
             <a:extLst>
               <a:ext uri="{91240B29-F687-4f45-9708-019B960494DF}">
-                <a14:hiddenLine xmlns="" xmlns:a14="http://schemas.microsoft.com/office/drawing/2010/main" w="9525">
+                <a14:hiddenLine xmlns:a14="http://schemas.microsoft.com/office/drawing/2010/main" xmlns="" w="9525">
                   <a:solidFill>
                     <a:srgbClr val="000000"/>
                   </a:solidFill>
@@ -3522,7 +3522,7 @@
             </a:ln>
             <a:extLst>
               <a:ext uri="{91240B29-F687-4f45-9708-019B960494DF}">
-                <a14:hiddenLine xmlns="" xmlns:a14="http://schemas.microsoft.com/office/drawing/2010/main" w="9525">
+                <a14:hiddenLine xmlns:a14="http://schemas.microsoft.com/office/drawing/2010/main" xmlns="" w="9525">
                   <a:solidFill>
                     <a:srgbClr val="000000"/>
                   </a:solidFill>
@@ -3612,7 +3612,7 @@
             </a:ln>
             <a:extLst>
               <a:ext uri="{91240B29-F687-4f45-9708-019B960494DF}">
-                <a14:hiddenLine xmlns="" xmlns:a14="http://schemas.microsoft.com/office/drawing/2010/main" w="9525">
+                <a14:hiddenLine xmlns:a14="http://schemas.microsoft.com/office/drawing/2010/main" xmlns="" w="9525">
                   <a:solidFill>
                     <a:srgbClr val="000000"/>
                   </a:solidFill>
@@ -3677,7 +3677,7 @@
             </a:ln>
             <a:extLst>
               <a:ext uri="{91240B29-F687-4f45-9708-019B960494DF}">
-                <a14:hiddenLine xmlns="" xmlns:a14="http://schemas.microsoft.com/office/drawing/2010/main" w="9525">
+                <a14:hiddenLine xmlns:a14="http://schemas.microsoft.com/office/drawing/2010/main" xmlns="" w="9525">
                   <a:solidFill>
                     <a:srgbClr val="000000"/>
                   </a:solidFill>
@@ -3739,7 +3739,7 @@
             </a:ln>
             <a:extLst>
               <a:ext uri="{91240B29-F687-4f45-9708-019B960494DF}">
-                <a14:hiddenLine xmlns="" xmlns:a14="http://schemas.microsoft.com/office/drawing/2010/main" w="9525">
+                <a14:hiddenLine xmlns:a14="http://schemas.microsoft.com/office/drawing/2010/main" xmlns="" w="9525">
                   <a:solidFill>
                     <a:srgbClr val="000000"/>
                   </a:solidFill>
@@ -3829,7 +3829,7 @@
             </a:ln>
             <a:extLst>
               <a:ext uri="{91240B29-F687-4f45-9708-019B960494DF}">
-                <a14:hiddenLine xmlns="" xmlns:a14="http://schemas.microsoft.com/office/drawing/2010/main" w="9525">
+                <a14:hiddenLine xmlns:a14="http://schemas.microsoft.com/office/drawing/2010/main" xmlns="" w="9525">
                   <a:solidFill>
                     <a:srgbClr val="000000"/>
                   </a:solidFill>
@@ -3919,7 +3919,7 @@
             </a:ln>
             <a:extLst>
               <a:ext uri="{91240B29-F687-4f45-9708-019B960494DF}">
-                <a14:hiddenLine xmlns="" xmlns:a14="http://schemas.microsoft.com/office/drawing/2010/main" w="9525">
+                <a14:hiddenLine xmlns:a14="http://schemas.microsoft.com/office/drawing/2010/main" xmlns="" w="9525">
                   <a:solidFill>
                     <a:srgbClr val="000000"/>
                   </a:solidFill>
@@ -3981,7 +3981,7 @@
             </a:ln>
             <a:extLst>
               <a:ext uri="{91240B29-F687-4f45-9708-019B960494DF}">
-                <a14:hiddenLine xmlns="" xmlns:a14="http://schemas.microsoft.com/office/drawing/2010/main" w="9525">
+                <a14:hiddenLine xmlns:a14="http://schemas.microsoft.com/office/drawing/2010/main" xmlns="" w="9525">
                   <a:solidFill>
                     <a:srgbClr val="000000"/>
                   </a:solidFill>
@@ -4101,7 +4101,7 @@
             </a:ln>
             <a:extLst>
               <a:ext uri="{91240B29-F687-4f45-9708-019B960494DF}">
-                <a14:hiddenLine xmlns="" xmlns:a14="http://schemas.microsoft.com/office/drawing/2010/main" w="9525">
+                <a14:hiddenLine xmlns:a14="http://schemas.microsoft.com/office/drawing/2010/main" xmlns="" w="9525">
                   <a:solidFill>
                     <a:srgbClr val="000000"/>
                   </a:solidFill>
@@ -4169,7 +4169,7 @@
             </a:ln>
             <a:extLst>
               <a:ext uri="{91240B29-F687-4f45-9708-019B960494DF}">
-                <a14:hiddenLine xmlns="" xmlns:a14="http://schemas.microsoft.com/office/drawing/2010/main" w="9525">
+                <a14:hiddenLine xmlns:a14="http://schemas.microsoft.com/office/drawing/2010/main" xmlns="" w="9525">
                   <a:solidFill>
                     <a:srgbClr val="000000"/>
                   </a:solidFill>
@@ -4259,7 +4259,7 @@
             </a:ln>
             <a:extLst>
               <a:ext uri="{91240B29-F687-4f45-9708-019B960494DF}">
-                <a14:hiddenLine xmlns="" xmlns:a14="http://schemas.microsoft.com/office/drawing/2010/main" w="9525">
+                <a14:hiddenLine xmlns:a14="http://schemas.microsoft.com/office/drawing/2010/main" xmlns="" w="9525">
                   <a:solidFill>
                     <a:srgbClr val="000000"/>
                   </a:solidFill>
@@ -4399,7 +4399,7 @@
           <a:p>
             <a:fld id="{A9E66B82-FD87-44C4-AFB6-D7AA7C09D1B4}" type="datetimeFigureOut">
               <a:rPr lang="pt-PT" smtClean="0"/>
-              <a:t>30/05/2022</a:t>
+              <a:t>31/05/2022</a:t>
             </a:fld>
             <a:endParaRPr lang="pt-PT"/>
           </a:p>
@@ -4666,7 +4666,7 @@
           <a:p>
             <a:fld id="{A9E66B82-FD87-44C4-AFB6-D7AA7C09D1B4}" type="datetimeFigureOut">
               <a:rPr lang="pt-PT" smtClean="0"/>
-              <a:t>30/05/2022</a:t>
+              <a:t>31/05/2022</a:t>
             </a:fld>
             <a:endParaRPr lang="pt-PT"/>
           </a:p>
@@ -4862,7 +4862,7 @@
           <a:p>
             <a:fld id="{A9E66B82-FD87-44C4-AFB6-D7AA7C09D1B4}" type="datetimeFigureOut">
               <a:rPr lang="pt-PT" smtClean="0"/>
-              <a:t>30/05/2022</a:t>
+              <a:t>31/05/2022</a:t>
             </a:fld>
             <a:endParaRPr lang="pt-PT"/>
           </a:p>
@@ -5125,7 +5125,7 @@
           <a:p>
             <a:fld id="{A9E66B82-FD87-44C4-AFB6-D7AA7C09D1B4}" type="datetimeFigureOut">
               <a:rPr lang="pt-PT" smtClean="0"/>
-              <a:t>30/05/2022</a:t>
+              <a:t>31/05/2022</a:t>
             </a:fld>
             <a:endParaRPr lang="pt-PT"/>
           </a:p>
@@ -5559,7 +5559,7 @@
           <a:p>
             <a:fld id="{A9E66B82-FD87-44C4-AFB6-D7AA7C09D1B4}" type="datetimeFigureOut">
               <a:rPr lang="pt-PT" smtClean="0"/>
-              <a:t>30/05/2022</a:t>
+              <a:t>31/05/2022</a:t>
             </a:fld>
             <a:endParaRPr lang="pt-PT"/>
           </a:p>
@@ -6105,7 +6105,7 @@
           <a:p>
             <a:fld id="{A9E66B82-FD87-44C4-AFB6-D7AA7C09D1B4}" type="datetimeFigureOut">
               <a:rPr lang="pt-PT" smtClean="0"/>
-              <a:t>30/05/2022</a:t>
+              <a:t>31/05/2022</a:t>
             </a:fld>
             <a:endParaRPr lang="pt-PT"/>
           </a:p>
@@ -6825,7 +6825,7 @@
           <a:p>
             <a:fld id="{A9E66B82-FD87-44C4-AFB6-D7AA7C09D1B4}" type="datetimeFigureOut">
               <a:rPr lang="pt-PT" smtClean="0"/>
-              <a:t>30/05/2022</a:t>
+              <a:t>31/05/2022</a:t>
             </a:fld>
             <a:endParaRPr lang="pt-PT"/>
           </a:p>
@@ -6995,7 +6995,7 @@
           <a:p>
             <a:fld id="{A9E66B82-FD87-44C4-AFB6-D7AA7C09D1B4}" type="datetimeFigureOut">
               <a:rPr lang="pt-PT" smtClean="0"/>
-              <a:t>30/05/2022</a:t>
+              <a:t>31/05/2022</a:t>
             </a:fld>
             <a:endParaRPr lang="pt-PT"/>
           </a:p>
@@ -7175,7 +7175,7 @@
           <a:p>
             <a:fld id="{A9E66B82-FD87-44C4-AFB6-D7AA7C09D1B4}" type="datetimeFigureOut">
               <a:rPr lang="pt-PT" smtClean="0"/>
-              <a:t>30/05/2022</a:t>
+              <a:t>31/05/2022</a:t>
             </a:fld>
             <a:endParaRPr lang="pt-PT"/>
           </a:p>
@@ -7345,7 +7345,7 @@
           <a:p>
             <a:fld id="{A9E66B82-FD87-44C4-AFB6-D7AA7C09D1B4}" type="datetimeFigureOut">
               <a:rPr lang="pt-PT" smtClean="0"/>
-              <a:t>30/05/2022</a:t>
+              <a:t>31/05/2022</a:t>
             </a:fld>
             <a:endParaRPr lang="pt-PT"/>
           </a:p>
@@ -7595,7 +7595,7 @@
           <a:p>
             <a:fld id="{A9E66B82-FD87-44C4-AFB6-D7AA7C09D1B4}" type="datetimeFigureOut">
               <a:rPr lang="pt-PT" smtClean="0"/>
-              <a:t>30/05/2022</a:t>
+              <a:t>31/05/2022</a:t>
             </a:fld>
             <a:endParaRPr lang="pt-PT"/>
           </a:p>
@@ -7827,7 +7827,7 @@
           <a:p>
             <a:fld id="{A9E66B82-FD87-44C4-AFB6-D7AA7C09D1B4}" type="datetimeFigureOut">
               <a:rPr lang="pt-PT" smtClean="0"/>
-              <a:t>30/05/2022</a:t>
+              <a:t>31/05/2022</a:t>
             </a:fld>
             <a:endParaRPr lang="pt-PT"/>
           </a:p>
@@ -8208,7 +8208,7 @@
           <a:p>
             <a:fld id="{A9E66B82-FD87-44C4-AFB6-D7AA7C09D1B4}" type="datetimeFigureOut">
               <a:rPr lang="pt-PT" smtClean="0"/>
-              <a:t>30/05/2022</a:t>
+              <a:t>31/05/2022</a:t>
             </a:fld>
             <a:endParaRPr lang="pt-PT"/>
           </a:p>
@@ -8326,7 +8326,7 @@
           <a:p>
             <a:fld id="{A9E66B82-FD87-44C4-AFB6-D7AA7C09D1B4}" type="datetimeFigureOut">
               <a:rPr lang="pt-PT" smtClean="0"/>
-              <a:t>30/05/2022</a:t>
+              <a:t>31/05/2022</a:t>
             </a:fld>
             <a:endParaRPr lang="pt-PT"/>
           </a:p>
@@ -8421,7 +8421,7 @@
           <a:p>
             <a:fld id="{A9E66B82-FD87-44C4-AFB6-D7AA7C09D1B4}" type="datetimeFigureOut">
               <a:rPr lang="pt-PT" smtClean="0"/>
-              <a:t>30/05/2022</a:t>
+              <a:t>31/05/2022</a:t>
             </a:fld>
             <a:endParaRPr lang="pt-PT"/>
           </a:p>
@@ -8670,7 +8670,7 @@
           <a:p>
             <a:fld id="{A9E66B82-FD87-44C4-AFB6-D7AA7C09D1B4}" type="datetimeFigureOut">
               <a:rPr lang="pt-PT" smtClean="0"/>
-              <a:t>30/05/2022</a:t>
+              <a:t>31/05/2022</a:t>
             </a:fld>
             <a:endParaRPr lang="pt-PT"/>
           </a:p>
@@ -8950,7 +8950,7 @@
           <a:p>
             <a:fld id="{A9E66B82-FD87-44C4-AFB6-D7AA7C09D1B4}" type="datetimeFigureOut">
               <a:rPr lang="pt-PT" smtClean="0"/>
-              <a:t>30/05/2022</a:t>
+              <a:t>31/05/2022</a:t>
             </a:fld>
             <a:endParaRPr lang="pt-PT"/>
           </a:p>
@@ -9073,7 +9073,7 @@
           <a:noFill/>
           <a:extLst>
             <a:ext uri="{909E8E84-426E-40dd-AFC4-6F175D3DCCD1}">
-              <a14:hiddenFill xmlns="" xmlns:a14="http://schemas.microsoft.com/office/drawing/2010/main">
+              <a14:hiddenFill xmlns:a14="http://schemas.microsoft.com/office/drawing/2010/main" xmlns="">
                 <a:solidFill>
                   <a:srgbClr val="FFFFFF"/>
                 </a:solidFill>
@@ -9147,7 +9147,7 @@
               </a:ln>
               <a:extLst>
                 <a:ext uri="{91240B29-F687-4f45-9708-019B960494DF}">
-                  <a14:hiddenLine xmlns="" xmlns:a14="http://schemas.microsoft.com/office/drawing/2010/main" w="9525">
+                  <a14:hiddenLine xmlns:a14="http://schemas.microsoft.com/office/drawing/2010/main" xmlns="" w="9525">
                     <a:solidFill>
                       <a:srgbClr val="000000"/>
                     </a:solidFill>
@@ -9237,7 +9237,7 @@
               </a:ln>
               <a:extLst>
                 <a:ext uri="{91240B29-F687-4f45-9708-019B960494DF}">
-                  <a14:hiddenLine xmlns="" xmlns:a14="http://schemas.microsoft.com/office/drawing/2010/main" w="9525">
+                  <a14:hiddenLine xmlns:a14="http://schemas.microsoft.com/office/drawing/2010/main" xmlns="" w="9525">
                     <a:solidFill>
                       <a:srgbClr val="000000"/>
                     </a:solidFill>
@@ -9327,7 +9327,7 @@
               </a:ln>
               <a:extLst>
                 <a:ext uri="{91240B29-F687-4f45-9708-019B960494DF}">
-                  <a14:hiddenLine xmlns="" xmlns:a14="http://schemas.microsoft.com/office/drawing/2010/main" w="9525">
+                  <a14:hiddenLine xmlns:a14="http://schemas.microsoft.com/office/drawing/2010/main" xmlns="" w="9525">
                     <a:solidFill>
                       <a:srgbClr val="000000"/>
                     </a:solidFill>
@@ -9389,7 +9389,7 @@
               </a:ln>
               <a:extLst>
                 <a:ext uri="{91240B29-F687-4f45-9708-019B960494DF}">
-                  <a14:hiddenLine xmlns="" xmlns:a14="http://schemas.microsoft.com/office/drawing/2010/main" w="9525">
+                  <a14:hiddenLine xmlns:a14="http://schemas.microsoft.com/office/drawing/2010/main" xmlns="" w="9525">
                     <a:solidFill>
                       <a:srgbClr val="000000"/>
                     </a:solidFill>
@@ -9479,7 +9479,7 @@
               </a:ln>
               <a:extLst>
                 <a:ext uri="{91240B29-F687-4f45-9708-019B960494DF}">
-                  <a14:hiddenLine xmlns="" xmlns:a14="http://schemas.microsoft.com/office/drawing/2010/main" w="9525">
+                  <a14:hiddenLine xmlns:a14="http://schemas.microsoft.com/office/drawing/2010/main" xmlns="" w="9525">
                     <a:solidFill>
                       <a:srgbClr val="000000"/>
                     </a:solidFill>
@@ -9541,7 +9541,7 @@
               </a:ln>
               <a:extLst>
                 <a:ext uri="{91240B29-F687-4f45-9708-019B960494DF}">
-                  <a14:hiddenLine xmlns="" xmlns:a14="http://schemas.microsoft.com/office/drawing/2010/main" w="9525">
+                  <a14:hiddenLine xmlns:a14="http://schemas.microsoft.com/office/drawing/2010/main" xmlns="" w="9525">
                     <a:solidFill>
                       <a:srgbClr val="000000"/>
                     </a:solidFill>
@@ -9603,7 +9603,7 @@
               </a:ln>
               <a:extLst>
                 <a:ext uri="{91240B29-F687-4f45-9708-019B960494DF}">
-                  <a14:hiddenLine xmlns="" xmlns:a14="http://schemas.microsoft.com/office/drawing/2010/main" w="9525">
+                  <a14:hiddenLine xmlns:a14="http://schemas.microsoft.com/office/drawing/2010/main" xmlns="" w="9525">
                     <a:solidFill>
                       <a:srgbClr val="000000"/>
                     </a:solidFill>
@@ -9693,7 +9693,7 @@
               </a:ln>
               <a:extLst>
                 <a:ext uri="{91240B29-F687-4f45-9708-019B960494DF}">
-                  <a14:hiddenLine xmlns="" xmlns:a14="http://schemas.microsoft.com/office/drawing/2010/main" w="9525">
+                  <a14:hiddenLine xmlns:a14="http://schemas.microsoft.com/office/drawing/2010/main" xmlns="" w="9525">
                     <a:solidFill>
                       <a:srgbClr val="000000"/>
                     </a:solidFill>
@@ -9783,7 +9783,7 @@
               </a:ln>
               <a:extLst>
                 <a:ext uri="{91240B29-F687-4f45-9708-019B960494DF}">
-                  <a14:hiddenLine xmlns="" xmlns:a14="http://schemas.microsoft.com/office/drawing/2010/main" w="9525">
+                  <a14:hiddenLine xmlns:a14="http://schemas.microsoft.com/office/drawing/2010/main" xmlns="" w="9525">
                     <a:solidFill>
                       <a:srgbClr val="000000"/>
                     </a:solidFill>
@@ -9845,7 +9845,7 @@
               </a:ln>
               <a:extLst>
                 <a:ext uri="{91240B29-F687-4f45-9708-019B960494DF}">
-                  <a14:hiddenLine xmlns="" xmlns:a14="http://schemas.microsoft.com/office/drawing/2010/main" w="9525">
+                  <a14:hiddenLine xmlns:a14="http://schemas.microsoft.com/office/drawing/2010/main" xmlns="" w="9525">
                     <a:solidFill>
                       <a:srgbClr val="000000"/>
                     </a:solidFill>
@@ -9955,7 +9955,7 @@
               </a:ln>
               <a:extLst>
                 <a:ext uri="{91240B29-F687-4f45-9708-019B960494DF}">
-                  <a14:hiddenLine xmlns="" xmlns:a14="http://schemas.microsoft.com/office/drawing/2010/main" w="9525">
+                  <a14:hiddenLine xmlns:a14="http://schemas.microsoft.com/office/drawing/2010/main" xmlns="" w="9525">
                     <a:solidFill>
                       <a:srgbClr val="000000"/>
                     </a:solidFill>
@@ -10039,7 +10039,7 @@
               </a:ln>
               <a:extLst>
                 <a:ext uri="{91240B29-F687-4f45-9708-019B960494DF}">
-                  <a14:hiddenLine xmlns="" xmlns:a14="http://schemas.microsoft.com/office/drawing/2010/main" w="9525">
+                  <a14:hiddenLine xmlns:a14="http://schemas.microsoft.com/office/drawing/2010/main" xmlns="" w="9525">
                     <a:solidFill>
                       <a:srgbClr val="000000"/>
                     </a:solidFill>
@@ -10101,7 +10101,7 @@
               </a:ln>
               <a:extLst>
                 <a:ext uri="{91240B29-F687-4f45-9708-019B960494DF}">
-                  <a14:hiddenLine xmlns="" xmlns:a14="http://schemas.microsoft.com/office/drawing/2010/main" w="9525">
+                  <a14:hiddenLine xmlns:a14="http://schemas.microsoft.com/office/drawing/2010/main" xmlns="" w="9525">
                     <a:solidFill>
                       <a:srgbClr val="000000"/>
                     </a:solidFill>
@@ -10163,7 +10163,7 @@
               </a:ln>
               <a:extLst>
                 <a:ext uri="{91240B29-F687-4f45-9708-019B960494DF}">
-                  <a14:hiddenLine xmlns="" xmlns:a14="http://schemas.microsoft.com/office/drawing/2010/main" w="9525">
+                  <a14:hiddenLine xmlns:a14="http://schemas.microsoft.com/office/drawing/2010/main" xmlns="" w="9525">
                     <a:solidFill>
                       <a:srgbClr val="000000"/>
                     </a:solidFill>
@@ -10253,7 +10253,7 @@
               </a:ln>
               <a:extLst>
                 <a:ext uri="{91240B29-F687-4f45-9708-019B960494DF}">
-                  <a14:hiddenLine xmlns="" xmlns:a14="http://schemas.microsoft.com/office/drawing/2010/main" w="9525">
+                  <a14:hiddenLine xmlns:a14="http://schemas.microsoft.com/office/drawing/2010/main" xmlns="" w="9525">
                     <a:solidFill>
                       <a:srgbClr val="000000"/>
                     </a:solidFill>
@@ -10287,7 +10287,7 @@
               </a:ln>
               <a:extLst>
                 <a:ext uri="{91240B29-F687-4f45-9708-019B960494DF}">
-                  <a14:hiddenLine xmlns="" xmlns:a14="http://schemas.microsoft.com/office/drawing/2010/main" w="9525">
+                  <a14:hiddenLine xmlns:a14="http://schemas.microsoft.com/office/drawing/2010/main" xmlns="" w="9525">
                     <a:solidFill>
                       <a:srgbClr val="000000"/>
                     </a:solidFill>
@@ -10352,7 +10352,7 @@
               </a:ln>
               <a:extLst>
                 <a:ext uri="{91240B29-F687-4f45-9708-019B960494DF}">
-                  <a14:hiddenLine xmlns="" xmlns:a14="http://schemas.microsoft.com/office/drawing/2010/main" w="9525">
+                  <a14:hiddenLine xmlns:a14="http://schemas.microsoft.com/office/drawing/2010/main" xmlns="" w="9525">
                     <a:solidFill>
                       <a:srgbClr val="000000"/>
                     </a:solidFill>
@@ -10442,7 +10442,7 @@
               </a:ln>
               <a:extLst>
                 <a:ext uri="{91240B29-F687-4f45-9708-019B960494DF}">
-                  <a14:hiddenLine xmlns="" xmlns:a14="http://schemas.microsoft.com/office/drawing/2010/main" w="9525">
+                  <a14:hiddenLine xmlns:a14="http://schemas.microsoft.com/office/drawing/2010/main" xmlns="" w="9525">
                     <a:solidFill>
                       <a:srgbClr val="000000"/>
                     </a:solidFill>
@@ -10504,7 +10504,7 @@
               </a:ln>
               <a:extLst>
                 <a:ext uri="{91240B29-F687-4f45-9708-019B960494DF}">
-                  <a14:hiddenLine xmlns="" xmlns:a14="http://schemas.microsoft.com/office/drawing/2010/main" w="9525">
+                  <a14:hiddenLine xmlns:a14="http://schemas.microsoft.com/office/drawing/2010/main" xmlns="" w="9525">
                     <a:solidFill>
                       <a:srgbClr val="000000"/>
                     </a:solidFill>
@@ -10594,7 +10594,7 @@
               </a:ln>
               <a:extLst>
                 <a:ext uri="{91240B29-F687-4f45-9708-019B960494DF}">
-                  <a14:hiddenLine xmlns="" xmlns:a14="http://schemas.microsoft.com/office/drawing/2010/main" w="9525">
+                  <a14:hiddenLine xmlns:a14="http://schemas.microsoft.com/office/drawing/2010/main" xmlns="" w="9525">
                     <a:solidFill>
                       <a:srgbClr val="000000"/>
                     </a:solidFill>
@@ -10659,7 +10659,7 @@
               </a:ln>
               <a:extLst>
                 <a:ext uri="{91240B29-F687-4f45-9708-019B960494DF}">
-                  <a14:hiddenLine xmlns="" xmlns:a14="http://schemas.microsoft.com/office/drawing/2010/main" w="9525">
+                  <a14:hiddenLine xmlns:a14="http://schemas.microsoft.com/office/drawing/2010/main" xmlns="" w="9525">
                     <a:solidFill>
                       <a:srgbClr val="000000"/>
                     </a:solidFill>
@@ -10721,7 +10721,7 @@
               </a:ln>
               <a:extLst>
                 <a:ext uri="{91240B29-F687-4f45-9708-019B960494DF}">
-                  <a14:hiddenLine xmlns="" xmlns:a14="http://schemas.microsoft.com/office/drawing/2010/main" w="9525">
+                  <a14:hiddenLine xmlns:a14="http://schemas.microsoft.com/office/drawing/2010/main" xmlns="" w="9525">
                     <a:solidFill>
                       <a:srgbClr val="000000"/>
                     </a:solidFill>
@@ -10811,7 +10811,7 @@
               </a:ln>
               <a:extLst>
                 <a:ext uri="{91240B29-F687-4f45-9708-019B960494DF}">
-                  <a14:hiddenLine xmlns="" xmlns:a14="http://schemas.microsoft.com/office/drawing/2010/main" w="9525">
+                  <a14:hiddenLine xmlns:a14="http://schemas.microsoft.com/office/drawing/2010/main" xmlns="" w="9525">
                     <a:solidFill>
                       <a:srgbClr val="000000"/>
                     </a:solidFill>
@@ -10901,7 +10901,7 @@
               </a:ln>
               <a:extLst>
                 <a:ext uri="{91240B29-F687-4f45-9708-019B960494DF}">
-                  <a14:hiddenLine xmlns="" xmlns:a14="http://schemas.microsoft.com/office/drawing/2010/main" w="9525">
+                  <a14:hiddenLine xmlns:a14="http://schemas.microsoft.com/office/drawing/2010/main" xmlns="" w="9525">
                     <a:solidFill>
                       <a:srgbClr val="000000"/>
                     </a:solidFill>
@@ -10966,7 +10966,7 @@
               </a:ln>
               <a:extLst>
                 <a:ext uri="{91240B29-F687-4f45-9708-019B960494DF}">
-                  <a14:hiddenLine xmlns="" xmlns:a14="http://schemas.microsoft.com/office/drawing/2010/main" w="9525">
+                  <a14:hiddenLine xmlns:a14="http://schemas.microsoft.com/office/drawing/2010/main" xmlns="" w="9525">
                     <a:solidFill>
                       <a:srgbClr val="000000"/>
                     </a:solidFill>
@@ -11086,7 +11086,7 @@
               </a:ln>
               <a:extLst>
                 <a:ext uri="{91240B29-F687-4f45-9708-019B960494DF}">
-                  <a14:hiddenLine xmlns="" xmlns:a14="http://schemas.microsoft.com/office/drawing/2010/main" w="9525">
+                  <a14:hiddenLine xmlns:a14="http://schemas.microsoft.com/office/drawing/2010/main" xmlns="" w="9525">
                     <a:solidFill>
                       <a:srgbClr val="000000"/>
                     </a:solidFill>
@@ -11184,7 +11184,7 @@
               </a:ln>
               <a:extLst>
                 <a:ext uri="{91240B29-F687-4f45-9708-019B960494DF}">
-                  <a14:hiddenLine xmlns="" xmlns:a14="http://schemas.microsoft.com/office/drawing/2010/main" w="9525">
+                  <a14:hiddenLine xmlns:a14="http://schemas.microsoft.com/office/drawing/2010/main" xmlns="" w="9525">
                     <a:solidFill>
                       <a:srgbClr val="000000"/>
                     </a:solidFill>
@@ -11299,7 +11299,7 @@
               </a:ln>
               <a:extLst>
                 <a:ext uri="{91240B29-F687-4f45-9708-019B960494DF}">
-                  <a14:hiddenLine xmlns="" xmlns:a14="http://schemas.microsoft.com/office/drawing/2010/main" w="9525">
+                  <a14:hiddenLine xmlns:a14="http://schemas.microsoft.com/office/drawing/2010/main" xmlns="" w="9525">
                     <a:solidFill>
                       <a:srgbClr val="000000"/>
                     </a:solidFill>
@@ -11389,7 +11389,7 @@
               </a:ln>
               <a:extLst>
                 <a:ext uri="{91240B29-F687-4f45-9708-019B960494DF}">
-                  <a14:hiddenLine xmlns="" xmlns:a14="http://schemas.microsoft.com/office/drawing/2010/main" w="9525">
+                  <a14:hiddenLine xmlns:a14="http://schemas.microsoft.com/office/drawing/2010/main" xmlns="" w="9525">
                     <a:solidFill>
                       <a:srgbClr val="000000"/>
                     </a:solidFill>
@@ -11454,7 +11454,7 @@
               </a:ln>
               <a:extLst>
                 <a:ext uri="{91240B29-F687-4f45-9708-019B960494DF}">
-                  <a14:hiddenLine xmlns="" xmlns:a14="http://schemas.microsoft.com/office/drawing/2010/main" w="9525">
+                  <a14:hiddenLine xmlns:a14="http://schemas.microsoft.com/office/drawing/2010/main" xmlns="" w="9525">
                     <a:solidFill>
                       <a:srgbClr val="000000"/>
                     </a:solidFill>
@@ -11544,7 +11544,7 @@
               </a:ln>
               <a:extLst>
                 <a:ext uri="{91240B29-F687-4f45-9708-019B960494DF}">
-                  <a14:hiddenLine xmlns="" xmlns:a14="http://schemas.microsoft.com/office/drawing/2010/main" w="9525">
+                  <a14:hiddenLine xmlns:a14="http://schemas.microsoft.com/office/drawing/2010/main" xmlns="" w="9525">
                     <a:solidFill>
                       <a:srgbClr val="000000"/>
                     </a:solidFill>
@@ -11612,7 +11612,7 @@
               </a:ln>
               <a:extLst>
                 <a:ext uri="{91240B29-F687-4f45-9708-019B960494DF}">
-                  <a14:hiddenLine xmlns="" xmlns:a14="http://schemas.microsoft.com/office/drawing/2010/main" w="9525">
+                  <a14:hiddenLine xmlns:a14="http://schemas.microsoft.com/office/drawing/2010/main" xmlns="" w="9525">
                     <a:solidFill>
                       <a:srgbClr val="000000"/>
                     </a:solidFill>
@@ -11702,7 +11702,7 @@
               </a:ln>
               <a:extLst>
                 <a:ext uri="{91240B29-F687-4f45-9708-019B960494DF}">
-                  <a14:hiddenLine xmlns="" xmlns:a14="http://schemas.microsoft.com/office/drawing/2010/main" w="9525">
+                  <a14:hiddenLine xmlns:a14="http://schemas.microsoft.com/office/drawing/2010/main" xmlns="" w="9525">
                     <a:solidFill>
                       <a:srgbClr val="000000"/>
                     </a:solidFill>
@@ -11770,7 +11770,7 @@
               </a:ln>
               <a:extLst>
                 <a:ext uri="{91240B29-F687-4f45-9708-019B960494DF}">
-                  <a14:hiddenLine xmlns="" xmlns:a14="http://schemas.microsoft.com/office/drawing/2010/main" w="9525">
+                  <a14:hiddenLine xmlns:a14="http://schemas.microsoft.com/office/drawing/2010/main" xmlns="" w="9525">
                     <a:solidFill>
                       <a:srgbClr val="000000"/>
                     </a:solidFill>
@@ -11860,7 +11860,7 @@
               </a:ln>
               <a:extLst>
                 <a:ext uri="{91240B29-F687-4f45-9708-019B960494DF}">
-                  <a14:hiddenLine xmlns="" xmlns:a14="http://schemas.microsoft.com/office/drawing/2010/main" w="9525">
+                  <a14:hiddenLine xmlns:a14="http://schemas.microsoft.com/office/drawing/2010/main" xmlns="" w="9525">
                     <a:solidFill>
                       <a:srgbClr val="000000"/>
                     </a:solidFill>
@@ -11894,7 +11894,7 @@
               </a:ln>
               <a:extLst>
                 <a:ext uri="{91240B29-F687-4f45-9708-019B960494DF}">
-                  <a14:hiddenLine xmlns="" xmlns:a14="http://schemas.microsoft.com/office/drawing/2010/main" w="9525">
+                  <a14:hiddenLine xmlns:a14="http://schemas.microsoft.com/office/drawing/2010/main" xmlns="" w="9525">
                     <a:solidFill>
                       <a:srgbClr val="000000"/>
                     </a:solidFill>
@@ -12034,7 +12034,7 @@
           <a:p>
             <a:fld id="{A9E66B82-FD87-44C4-AFB6-D7AA7C09D1B4}" type="datetimeFigureOut">
               <a:rPr lang="pt-PT" smtClean="0"/>
-              <a:t>30/05/2022</a:t>
+              <a:t>31/05/2022</a:t>
             </a:fld>
             <a:endParaRPr lang="pt-PT"/>
           </a:p>
@@ -12518,8 +12518,20 @@
           <a:lstStyle/>
           <a:p>
             <a:r>
+              <a:rPr lang="pt-PT" i="1" dirty="0" err="1"/>
+              <a:t>Run</a:t>
+            </a:r>
+            <a:r>
               <a:rPr lang="pt-PT" i="1" dirty="0"/>
-              <a:t>Run Lenght encoding</a:t>
+              <a:t> </a:t>
+            </a:r>
+            <a:r>
+              <a:rPr lang="pt-PT" i="1" dirty="0" err="1"/>
+              <a:t>LengTh</a:t>
+            </a:r>
+            <a:r>
+              <a:rPr lang="pt-PT" i="1" dirty="0"/>
+              <a:t> encoding</a:t>
             </a:r>
           </a:p>
         </p:txBody>
@@ -12553,13 +12565,8 @@
           <a:p>
             <a:r>
               <a:rPr lang="pt-PT" dirty="0"/>
-              <a:t>Ana Almeida </a:t>
+              <a:t>Ana Almeida - 35456</a:t>
             </a:r>
-            <a:r>
-              <a:rPr lang="pt-PT"/>
-              <a:t>- 35456</a:t>
-            </a:r>
-            <a:endParaRPr lang="pt-PT" dirty="0"/>
           </a:p>
           <a:p>
             <a:r>
@@ -12975,7 +12982,7 @@
           <a:p>
             <a:r>
               <a:rPr lang="pt-PT" dirty="0"/>
-              <a:t>Compressão de imagem</a:t>
+              <a:t>Compressão e Descompressão de imagem</a:t>
             </a:r>
           </a:p>
         </p:txBody>

</xml_diff>